<commit_message>
Updated final project specifications.
</commit_message>
<xml_diff>
--- a/docs/presentations/MMR W6D2 Final Project.pptx
+++ b/docs/presentations/MMR W6D2 Final Project.pptx
@@ -4189,11 +4189,7 @@
             </a:br>
             <a:r>
               <a:rPr lang="en-US" dirty="0" smtClean="0"/>
-              <a:t>Final </a:t>
-            </a:r>
-            <a:r>
-              <a:rPr lang="en-US" dirty="0" smtClean="0"/>
-              <a:t>Project</a:t>
+              <a:t>Final Project</a:t>
             </a:r>
             <a:endParaRPr lang="en-US" dirty="0"/>
           </a:p>
@@ -4610,7 +4606,11 @@
             </a:r>
             <a:r>
               <a:rPr lang="en-US" dirty="0" smtClean="0"/>
-              <a:t>First 5 to submit =&gt; +10 pts to Project grade</a:t>
+              <a:t>First 5 to submit =&gt; +10 pts to Project </a:t>
+            </a:r>
+            <a:r>
+              <a:rPr lang="en-US" dirty="0" smtClean="0"/>
+              <a:t>grade</a:t>
             </a:r>
           </a:p>
           <a:p>
@@ -4620,15 +4620,18 @@
             </a:r>
             <a:r>
               <a:rPr lang="en-US" dirty="0" smtClean="0"/>
-              <a:t>Good unit tests </a:t>
+              <a:t>Additional requirement: user should still be notified when the started timer duration elapses even after navigating to other pages. =&gt; +20 pts to Project grade</a:t>
+            </a:r>
+            <a:endParaRPr lang="en-US" dirty="0" smtClean="0"/>
+          </a:p>
+          <a:p>
+            <a:r>
+              <a:rPr lang="en-US" dirty="0"/>
+              <a:t> </a:t>
             </a:r>
             <a:r>
               <a:rPr lang="en-US" dirty="0" smtClean="0"/>
-              <a:t>coverage (70%) </a:t>
-            </a:r>
-            <a:r>
-              <a:rPr lang="en-US" dirty="0" smtClean="0"/>
-              <a:t>=&gt; +10 pts to Project grade</a:t>
+              <a:t>Good unit tests coverage (70%) =&gt; +10 pts to Project grade</a:t>
             </a:r>
           </a:p>
           <a:p>
@@ -4811,11 +4814,7 @@
             <a:pPr algn="ctr"/>
             <a:r>
               <a:rPr lang="en-US" dirty="0" smtClean="0"/>
-              <a:t>Final </a:t>
-            </a:r>
-            <a:r>
-              <a:rPr lang="en-US" dirty="0" smtClean="0"/>
-              <a:t>Project</a:t>
+              <a:t>Final Project</a:t>
             </a:r>
             <a:endParaRPr lang="en-US" dirty="0"/>
           </a:p>
@@ -5179,8 +5178,8 @@
         </p:nvSpPr>
         <p:spPr>
           <a:xfrm>
-            <a:off x="432154" y="911225"/>
-            <a:ext cx="7088319" cy="4810845"/>
+            <a:off x="386499" y="801298"/>
+            <a:ext cx="7088319" cy="5396269"/>
           </a:xfrm>
         </p:spPr>
         <p:txBody>
@@ -5266,6 +5265,10 @@
             </a:r>
           </a:p>
           <a:p>
+            <a:r>
+              <a:rPr lang="en-PH" dirty="0" smtClean="0"/>
+              <a:t>User should be alerted when the timer duration elapses.</a:t>
+            </a:r>
             <a:endParaRPr lang="en-PH" dirty="0"/>
           </a:p>
           <a:p>
@@ -6064,6 +6067,28 @@
 </file>
 
 <file path=customXml/item1.xml><?xml version="1.0" encoding="utf-8"?>
+<?mso-contentType ?>
+<FormTemplates xmlns="http://schemas.microsoft.com/sharepoint/v3/contenttype/forms">
+  <Display>DocumentLibraryForm</Display>
+  <Edit>DocumentLibraryForm</Edit>
+  <New>DocumentLibraryForm</New>
+</FormTemplates>
+</file>
+
+<file path=customXml/item2.xml><?xml version="1.0" encoding="utf-8"?>
+<p:properties xmlns:p="http://schemas.microsoft.com/office/2006/metadata/properties" xmlns:xsi="http://www.w3.org/2001/XMLSchema-instance" xmlns:pc="http://schemas.microsoft.com/office/infopath/2007/PartnerControls">
+  <documentManagement>
+    <Company xmlns="f0d6b4bb-fd12-4740-8884-687737dcca9a">Magenic</Company>
+    <Tech_x0020_Used xmlns="f0d6b4bb-fd12-4740-8884-687737dcca9a"/>
+    <Document_x0020_Type xmlns="f0d6b4bb-fd12-4740-8884-687737dcca9a">
+      <Value>Template</Value>
+    </Document_x0020_Type>
+    <Industry_x002f_Vertical xmlns="f0d6b4bb-fd12-4740-8884-687737dcca9a" xsi:nil="true"/>
+  </documentManagement>
+</p:properties>
+</file>
+
+<file path=customXml/item3.xml><?xml version="1.0" encoding="utf-8"?>
 <ct:contentTypeSchema xmlns:ct="http://schemas.microsoft.com/office/2006/metadata/contentType" xmlns:ma="http://schemas.microsoft.com/office/2006/metadata/properties/metaAttributes" ct:_="" ma:_="" ma:contentTypeName="Document" ma:contentTypeID="0x010100FD047A0B1BD8FE45B080D14CD83AD5DB" ma:contentTypeVersion="4" ma:contentTypeDescription="Create a new document." ma:contentTypeScope="" ma:versionID="732beed655f90311345169d5c7f55f96">
   <xsd:schema xmlns:xsd="http://www.w3.org/2001/XMLSchema" xmlns:xs="http://www.w3.org/2001/XMLSchema" xmlns:p="http://schemas.microsoft.com/office/2006/metadata/properties" xmlns:ns2="f0d6b4bb-fd12-4740-8884-687737dcca9a" targetNamespace="http://schemas.microsoft.com/office/2006/metadata/properties" ma:root="true" ma:fieldsID="4ef6a310962b90ee3fe3c0e9cfa1177a" ns2:_="">
     <xsd:import namespace="f0d6b4bb-fd12-4740-8884-687737dcca9a"/>
@@ -6261,42 +6286,10 @@
 </ct:contentTypeSchema>
 </file>
 
-<file path=customXml/item2.xml><?xml version="1.0" encoding="utf-8"?>
-<p:properties xmlns:p="http://schemas.microsoft.com/office/2006/metadata/properties" xmlns:xsi="http://www.w3.org/2001/XMLSchema-instance" xmlns:pc="http://schemas.microsoft.com/office/infopath/2007/PartnerControls">
-  <documentManagement>
-    <Company xmlns="f0d6b4bb-fd12-4740-8884-687737dcca9a">Magenic</Company>
-    <Tech_x0020_Used xmlns="f0d6b4bb-fd12-4740-8884-687737dcca9a"/>
-    <Document_x0020_Type xmlns="f0d6b4bb-fd12-4740-8884-687737dcca9a">
-      <Value>Template</Value>
-    </Document_x0020_Type>
-    <Industry_x002f_Vertical xmlns="f0d6b4bb-fd12-4740-8884-687737dcca9a" xsi:nil="true"/>
-  </documentManagement>
-</p:properties>
-</file>
-
-<file path=customXml/item3.xml><?xml version="1.0" encoding="utf-8"?>
-<?mso-contentType ?>
-<FormTemplates xmlns="http://schemas.microsoft.com/sharepoint/v3/contenttype/forms">
-  <Display>DocumentLibraryForm</Display>
-  <Edit>DocumentLibraryForm</Edit>
-  <New>DocumentLibraryForm</New>
-</FormTemplates>
-</file>
-
 <file path=customXml/itemProps1.xml><?xml version="1.0" encoding="utf-8"?>
-<ds:datastoreItem xmlns:ds="http://schemas.openxmlformats.org/officeDocument/2006/customXml" ds:itemID="{215D891D-18BB-4FBC-9954-A01A3A7BC037}">
+<ds:datastoreItem xmlns:ds="http://schemas.openxmlformats.org/officeDocument/2006/customXml" ds:itemID="{D18D97D8-3C52-47EE-88EC-CF46155D7428}">
   <ds:schemaRefs>
-    <ds:schemaRef ds:uri="http://schemas.microsoft.com/office/2006/metadata/contentType"/>
-    <ds:schemaRef ds:uri="http://schemas.microsoft.com/office/2006/metadata/properties/metaAttributes"/>
-    <ds:schemaRef ds:uri="http://www.w3.org/2001/XMLSchema"/>
-    <ds:schemaRef ds:uri="http://schemas.microsoft.com/office/2006/metadata/properties"/>
-    <ds:schemaRef ds:uri="f0d6b4bb-fd12-4740-8884-687737dcca9a"/>
-    <ds:schemaRef ds:uri="http://schemas.microsoft.com/office/2006/documentManagement/types"/>
-    <ds:schemaRef ds:uri="http://schemas.microsoft.com/office/infopath/2007/PartnerControls"/>
-    <ds:schemaRef ds:uri="http://schemas.openxmlformats.org/package/2006/metadata/core-properties"/>
-    <ds:schemaRef ds:uri="http://purl.org/dc/elements/1.1/"/>
-    <ds:schemaRef ds:uri="http://purl.org/dc/terms/"/>
-    <ds:schemaRef ds:uri="http://schemas.microsoft.com/internal/obd"/>
+    <ds:schemaRef ds:uri="http://schemas.microsoft.com/sharepoint/v3/contenttype/forms"/>
   </ds:schemaRefs>
 </ds:datastoreItem>
 </file>
@@ -6318,9 +6311,19 @@
 </file>
 
 <file path=customXml/itemProps3.xml><?xml version="1.0" encoding="utf-8"?>
-<ds:datastoreItem xmlns:ds="http://schemas.openxmlformats.org/officeDocument/2006/customXml" ds:itemID="{D18D97D8-3C52-47EE-88EC-CF46155D7428}">
+<ds:datastoreItem xmlns:ds="http://schemas.openxmlformats.org/officeDocument/2006/customXml" ds:itemID="{215D891D-18BB-4FBC-9954-A01A3A7BC037}">
   <ds:schemaRefs>
-    <ds:schemaRef ds:uri="http://schemas.microsoft.com/sharepoint/v3/contenttype/forms"/>
+    <ds:schemaRef ds:uri="http://schemas.microsoft.com/office/2006/metadata/contentType"/>
+    <ds:schemaRef ds:uri="http://schemas.microsoft.com/office/2006/metadata/properties/metaAttributes"/>
+    <ds:schemaRef ds:uri="http://www.w3.org/2001/XMLSchema"/>
+    <ds:schemaRef ds:uri="http://schemas.microsoft.com/office/2006/metadata/properties"/>
+    <ds:schemaRef ds:uri="f0d6b4bb-fd12-4740-8884-687737dcca9a"/>
+    <ds:schemaRef ds:uri="http://schemas.microsoft.com/office/2006/documentManagement/types"/>
+    <ds:schemaRef ds:uri="http://schemas.microsoft.com/office/infopath/2007/PartnerControls"/>
+    <ds:schemaRef ds:uri="http://schemas.openxmlformats.org/package/2006/metadata/core-properties"/>
+    <ds:schemaRef ds:uri="http://purl.org/dc/elements/1.1/"/>
+    <ds:schemaRef ds:uri="http://purl.org/dc/terms/"/>
+    <ds:schemaRef ds:uri="http://schemas.microsoft.com/internal/obd"/>
   </ds:schemaRefs>
 </ds:datastoreItem>
 </file>
</xml_diff>